<commit_message>
finished part 2 wooooo
</commit_message>
<xml_diff>
--- a/PS2/proj2_template.pptx
+++ b/PS2/proj2_template.pptx
@@ -121,6 +121,11 @@
       </a:defRPr>
     </a:lvl9pPr>
   </p:defaultTextStyle>
+  <p:extLst>
+    <p:ext uri="{EFAFB233-063F-42B5-8137-9DF3F51BA10A}">
+      <p15:sldGuideLst xmlns:p15="http://schemas.microsoft.com/office/powerpoint/2012/main"/>
+    </p:ext>
+  </p:extLst>
 </p:presentation>
 </file>
 
@@ -10060,7 +10065,7 @@
               </a:tabLst>
             </a:pPr>
             <a:r>
-              <a:rPr lang="en-US" sz="1400" b="0" strike="noStrike" spc="-1">
+              <a:rPr lang="en-US" sz="1400" b="0" strike="noStrike" spc="-1" dirty="0">
                 <a:solidFill>
                   <a:srgbClr val="595959"/>
                 </a:solidFill>
@@ -10069,8 +10074,12 @@
               </a:rPr>
               <a:t>&lt;Copy two images of your fiducial object here [2]&gt;</a:t>
             </a:r>
-            <a:endParaRPr lang="en-US" sz="1400" b="0" strike="noStrike" spc="-1">
-              <a:latin typeface="Arial"/>
+            <a:endParaRPr lang="en-US" sz="1400" spc="-1" dirty="0">
+              <a:solidFill>
+                <a:srgbClr val="595959"/>
+              </a:solidFill>
+              <a:latin typeface="Arial"/>
+              <a:ea typeface="Arial"/>
             </a:endParaRPr>
           </a:p>
           <a:p>
@@ -10078,14 +10087,36 @@
               <a:lnSpc>
                 <a:spcPct val="115000"/>
               </a:lnSpc>
-              <a:spcBef>
-                <a:spcPts val="1599"/>
-              </a:spcBef>
               <a:tabLst>
                 <a:tab pos="0" algn="l"/>
               </a:tabLst>
             </a:pPr>
-            <a:endParaRPr lang="en-US" sz="1400" b="0" strike="noStrike" spc="-1">
+            <a:endParaRPr lang="en-US" sz="1400" spc="-1" dirty="0">
+              <a:solidFill>
+                <a:srgbClr val="595959"/>
+              </a:solidFill>
+              <a:latin typeface="Arial"/>
+            </a:endParaRPr>
+          </a:p>
+          <a:p>
+            <a:pPr>
+              <a:lnSpc>
+                <a:spcPct val="115000"/>
+              </a:lnSpc>
+              <a:tabLst>
+                <a:tab pos="0" algn="l"/>
+              </a:tabLst>
+            </a:pPr>
+            <a:r>
+              <a:rPr lang="en-US" sz="1400" spc="-1" dirty="0">
+                <a:solidFill>
+                  <a:srgbClr val="595959"/>
+                </a:solidFill>
+                <a:latin typeface="Arial"/>
+              </a:rPr>
+              <a:t>                                   box_img1.jpg                                                              box_img2.jpg      </a:t>
+            </a:r>
+            <a:endParaRPr lang="en-US" sz="1400" b="0" strike="noStrike" spc="-1" dirty="0">
               <a:latin typeface="Arial"/>
             </a:endParaRPr>
           </a:p>
@@ -10123,6 +10154,100 @@
           <a:fontRef idx="minor"/>
         </p:style>
       </p:sp>
+      <p:pic>
+        <p:nvPicPr>
+          <p:cNvPr id="3074" name="Picture 2">
+            <a:extLst>
+              <a:ext uri="{FF2B5EF4-FFF2-40B4-BE49-F238E27FC236}">
+                <a16:creationId xmlns:a16="http://schemas.microsoft.com/office/drawing/2014/main" id="{ECBABDA1-2D81-4E33-A234-2C365364340C}"/>
+              </a:ext>
+            </a:extLst>
+          </p:cNvPr>
+          <p:cNvPicPr>
+            <a:picLocks noChangeAspect="1" noChangeArrowheads="1"/>
+          </p:cNvPicPr>
+          <p:nvPr/>
+        </p:nvPicPr>
+        <p:blipFill>
+          <a:blip r:embed="rId2">
+            <a:extLst>
+              <a:ext uri="{28A0092B-C50C-407E-A947-70E740481C1C}">
+                <a14:useLocalDpi xmlns:a14="http://schemas.microsoft.com/office/drawing/2010/main" val="0"/>
+              </a:ext>
+            </a:extLst>
+          </a:blip>
+          <a:srcRect/>
+          <a:stretch>
+            <a:fillRect/>
+          </a:stretch>
+        </p:blipFill>
+        <p:spPr bwMode="auto">
+          <a:xfrm>
+            <a:off x="601397" y="1665186"/>
+            <a:ext cx="4152305" cy="2768203"/>
+          </a:xfrm>
+          <a:prstGeom prst="rect">
+            <a:avLst/>
+          </a:prstGeom>
+          <a:noFill/>
+          <a:extLst>
+            <a:ext uri="{909E8E84-426E-40DD-AFC4-6F175D3DCCD1}">
+              <a14:hiddenFill xmlns:a14="http://schemas.microsoft.com/office/drawing/2010/main">
+                <a:solidFill>
+                  <a:srgbClr val="FFFFFF"/>
+                </a:solidFill>
+              </a14:hiddenFill>
+            </a:ext>
+          </a:extLst>
+        </p:spPr>
+      </p:pic>
+      <p:pic>
+        <p:nvPicPr>
+          <p:cNvPr id="3076" name="Picture 4">
+            <a:extLst>
+              <a:ext uri="{FF2B5EF4-FFF2-40B4-BE49-F238E27FC236}">
+                <a16:creationId xmlns:a16="http://schemas.microsoft.com/office/drawing/2014/main" id="{9C392E1E-2B36-4061-A902-DD3FF27DBEC1}"/>
+              </a:ext>
+            </a:extLst>
+          </p:cNvPr>
+          <p:cNvPicPr>
+            <a:picLocks noChangeAspect="1" noChangeArrowheads="1"/>
+          </p:cNvPicPr>
+          <p:nvPr/>
+        </p:nvPicPr>
+        <p:blipFill>
+          <a:blip r:embed="rId3">
+            <a:extLst>
+              <a:ext uri="{28A0092B-C50C-407E-A947-70E740481C1C}">
+                <a14:useLocalDpi xmlns:a14="http://schemas.microsoft.com/office/drawing/2010/main" val="0"/>
+              </a:ext>
+            </a:extLst>
+          </a:blip>
+          <a:srcRect/>
+          <a:stretch>
+            <a:fillRect/>
+          </a:stretch>
+        </p:blipFill>
+        <p:spPr bwMode="auto">
+          <a:xfrm>
+            <a:off x="4647300" y="1665186"/>
+            <a:ext cx="4152305" cy="2768203"/>
+          </a:xfrm>
+          <a:prstGeom prst="rect">
+            <a:avLst/>
+          </a:prstGeom>
+          <a:noFill/>
+          <a:extLst>
+            <a:ext uri="{909E8E84-426E-40DD-AFC4-6F175D3DCCD1}">
+              <a14:hiddenFill xmlns:a14="http://schemas.microsoft.com/office/drawing/2010/main">
+                <a:solidFill>
+                  <a:srgbClr val="FFFFFF"/>
+                </a:solidFill>
+              </a14:hiddenFill>
+            </a:ext>
+          </a:extLst>
+        </p:spPr>
+      </p:pic>
     </p:spTree>
   </p:cSld>
   <p:clrMapOvr>
@@ -10351,7 +10476,7 @@
               </a:tabLst>
             </a:pPr>
             <a:r>
-              <a:rPr lang="en-US" sz="1400" b="0" strike="noStrike" spc="-1">
+              <a:rPr lang="en-US" sz="1400" b="0" strike="noStrike" spc="-1" dirty="0">
                 <a:solidFill>
                   <a:srgbClr val="595959"/>
                 </a:solidFill>
@@ -10360,7 +10485,7 @@
               </a:rPr>
               <a:t>&lt;Insert visualization for the initialized camera pose for 2nd image&gt; [1]</a:t>
             </a:r>
-            <a:endParaRPr lang="en-US" sz="1400" b="0" strike="noStrike" spc="-1">
+            <a:endParaRPr lang="en-US" sz="1400" b="0" strike="noStrike" spc="-1" dirty="0">
               <a:latin typeface="Arial"/>
             </a:endParaRPr>
           </a:p>
@@ -10373,12 +10498,106 @@
                 <a:tab pos="0" algn="l"/>
               </a:tabLst>
             </a:pPr>
-            <a:endParaRPr lang="en-US" sz="1400" b="0" strike="noStrike" spc="-1">
-              <a:latin typeface="Arial"/>
-            </a:endParaRPr>
-          </a:p>
-        </p:txBody>
-      </p:sp>
+            <a:endParaRPr lang="en-US" sz="1400" b="0" strike="noStrike" spc="-1" dirty="0">
+              <a:latin typeface="Arial"/>
+            </a:endParaRPr>
+          </a:p>
+        </p:txBody>
+      </p:sp>
+      <p:pic>
+        <p:nvPicPr>
+          <p:cNvPr id="1028" name="Picture 4">
+            <a:extLst>
+              <a:ext uri="{FF2B5EF4-FFF2-40B4-BE49-F238E27FC236}">
+                <a16:creationId xmlns:a16="http://schemas.microsoft.com/office/drawing/2014/main" id="{390C6FCF-EF89-4797-8E0C-71D6397F7C9C}"/>
+              </a:ext>
+            </a:extLst>
+          </p:cNvPr>
+          <p:cNvPicPr>
+            <a:picLocks noChangeAspect="1" noChangeArrowheads="1"/>
+          </p:cNvPicPr>
+          <p:nvPr/>
+        </p:nvPicPr>
+        <p:blipFill>
+          <a:blip r:embed="rId2">
+            <a:extLst>
+              <a:ext uri="{28A0092B-C50C-407E-A947-70E740481C1C}">
+                <a14:useLocalDpi xmlns:a14="http://schemas.microsoft.com/office/drawing/2010/main" val="0"/>
+              </a:ext>
+            </a:extLst>
+          </a:blip>
+          <a:srcRect/>
+          <a:stretch>
+            <a:fillRect/>
+          </a:stretch>
+        </p:blipFill>
+        <p:spPr bwMode="auto">
+          <a:xfrm>
+            <a:off x="385330" y="1710604"/>
+            <a:ext cx="2990850" cy="2886075"/>
+          </a:xfrm>
+          <a:prstGeom prst="rect">
+            <a:avLst/>
+          </a:prstGeom>
+          <a:noFill/>
+          <a:extLst>
+            <a:ext uri="{909E8E84-426E-40DD-AFC4-6F175D3DCCD1}">
+              <a14:hiddenFill xmlns:a14="http://schemas.microsoft.com/office/drawing/2010/main">
+                <a:solidFill>
+                  <a:srgbClr val="FFFFFF"/>
+                </a:solidFill>
+              </a14:hiddenFill>
+            </a:ext>
+          </a:extLst>
+        </p:spPr>
+      </p:pic>
+      <p:pic>
+        <p:nvPicPr>
+          <p:cNvPr id="1030" name="Picture 6">
+            <a:extLst>
+              <a:ext uri="{FF2B5EF4-FFF2-40B4-BE49-F238E27FC236}">
+                <a16:creationId xmlns:a16="http://schemas.microsoft.com/office/drawing/2014/main" id="{BCE2BC16-BA4E-4C8F-90C8-4FFA95F7A4BB}"/>
+              </a:ext>
+            </a:extLst>
+          </p:cNvPr>
+          <p:cNvPicPr>
+            <a:picLocks noChangeAspect="1" noChangeArrowheads="1"/>
+          </p:cNvPicPr>
+          <p:nvPr/>
+        </p:nvPicPr>
+        <p:blipFill>
+          <a:blip r:embed="rId3">
+            <a:extLst>
+              <a:ext uri="{28A0092B-C50C-407E-A947-70E740481C1C}">
+                <a14:useLocalDpi xmlns:a14="http://schemas.microsoft.com/office/drawing/2010/main" val="0"/>
+              </a:ext>
+            </a:extLst>
+          </a:blip>
+          <a:srcRect/>
+          <a:stretch>
+            <a:fillRect/>
+          </a:stretch>
+        </p:blipFill>
+        <p:spPr bwMode="auto">
+          <a:xfrm>
+            <a:off x="4749610" y="1710604"/>
+            <a:ext cx="2990850" cy="2886075"/>
+          </a:xfrm>
+          <a:prstGeom prst="rect">
+            <a:avLst/>
+          </a:prstGeom>
+          <a:noFill/>
+          <a:extLst>
+            <a:ext uri="{909E8E84-426E-40DD-AFC4-6F175D3DCCD1}">
+              <a14:hiddenFill xmlns:a14="http://schemas.microsoft.com/office/drawing/2010/main">
+                <a:solidFill>
+                  <a:srgbClr val="FFFFFF"/>
+                </a:solidFill>
+              </a14:hiddenFill>
+            </a:ext>
+          </a:extLst>
+        </p:spPr>
+      </p:pic>
     </p:spTree>
   </p:cSld>
   <p:clrMapOvr>
@@ -10635,6 +10854,100 @@
           </a:p>
         </p:txBody>
       </p:sp>
+      <p:pic>
+        <p:nvPicPr>
+          <p:cNvPr id="2050" name="Picture 2">
+            <a:extLst>
+              <a:ext uri="{FF2B5EF4-FFF2-40B4-BE49-F238E27FC236}">
+                <a16:creationId xmlns:a16="http://schemas.microsoft.com/office/drawing/2014/main" id="{7EBE0730-8423-4E5C-8E48-A39011C1CA63}"/>
+              </a:ext>
+            </a:extLst>
+          </p:cNvPr>
+          <p:cNvPicPr>
+            <a:picLocks noChangeAspect="1" noChangeArrowheads="1"/>
+          </p:cNvPicPr>
+          <p:nvPr/>
+        </p:nvPicPr>
+        <p:blipFill>
+          <a:blip r:embed="rId2">
+            <a:extLst>
+              <a:ext uri="{28A0092B-C50C-407E-A947-70E740481C1C}">
+                <a14:useLocalDpi xmlns:a14="http://schemas.microsoft.com/office/drawing/2010/main" val="0"/>
+              </a:ext>
+            </a:extLst>
+          </a:blip>
+          <a:srcRect/>
+          <a:stretch>
+            <a:fillRect/>
+          </a:stretch>
+        </p:blipFill>
+        <p:spPr bwMode="auto">
+          <a:xfrm>
+            <a:off x="4676040" y="1936173"/>
+            <a:ext cx="3152775" cy="2400300"/>
+          </a:xfrm>
+          <a:prstGeom prst="rect">
+            <a:avLst/>
+          </a:prstGeom>
+          <a:noFill/>
+          <a:extLst>
+            <a:ext uri="{909E8E84-426E-40DD-AFC4-6F175D3DCCD1}">
+              <a14:hiddenFill xmlns:a14="http://schemas.microsoft.com/office/drawing/2010/main">
+                <a:solidFill>
+                  <a:srgbClr val="FFFFFF"/>
+                </a:solidFill>
+              </a14:hiddenFill>
+            </a:ext>
+          </a:extLst>
+        </p:spPr>
+      </p:pic>
+      <p:pic>
+        <p:nvPicPr>
+          <p:cNvPr id="2052" name="Picture 4">
+            <a:extLst>
+              <a:ext uri="{FF2B5EF4-FFF2-40B4-BE49-F238E27FC236}">
+                <a16:creationId xmlns:a16="http://schemas.microsoft.com/office/drawing/2014/main" id="{B0006EFE-7BB4-4863-810F-39173795238D}"/>
+              </a:ext>
+            </a:extLst>
+          </p:cNvPr>
+          <p:cNvPicPr>
+            <a:picLocks noChangeAspect="1" noChangeArrowheads="1"/>
+          </p:cNvPicPr>
+          <p:nvPr/>
+        </p:nvPicPr>
+        <p:blipFill>
+          <a:blip r:embed="rId3">
+            <a:extLst>
+              <a:ext uri="{28A0092B-C50C-407E-A947-70E740481C1C}">
+                <a14:useLocalDpi xmlns:a14="http://schemas.microsoft.com/office/drawing/2010/main" val="0"/>
+              </a:ext>
+            </a:extLst>
+          </a:blip>
+          <a:srcRect/>
+          <a:stretch>
+            <a:fillRect/>
+          </a:stretch>
+        </p:blipFill>
+        <p:spPr bwMode="auto">
+          <a:xfrm>
+            <a:off x="447690" y="1936173"/>
+            <a:ext cx="3152775" cy="2400300"/>
+          </a:xfrm>
+          <a:prstGeom prst="rect">
+            <a:avLst/>
+          </a:prstGeom>
+          <a:noFill/>
+          <a:extLst>
+            <a:ext uri="{909E8E84-426E-40DD-AFC4-6F175D3DCCD1}">
+              <a14:hiddenFill xmlns:a14="http://schemas.microsoft.com/office/drawing/2010/main">
+                <a:solidFill>
+                  <a:srgbClr val="FFFFFF"/>
+                </a:solidFill>
+              </a14:hiddenFill>
+            </a:ext>
+          </a:extLst>
+        </p:spPr>
+      </p:pic>
     </p:spTree>
   </p:cSld>
   <p:clrMapOvr>
@@ -10782,6 +11095,53 @@
           </a:p>
         </p:txBody>
       </p:sp>
+      <p:pic>
+        <p:nvPicPr>
+          <p:cNvPr id="4098" name="Picture 2">
+            <a:extLst>
+              <a:ext uri="{FF2B5EF4-FFF2-40B4-BE49-F238E27FC236}">
+                <a16:creationId xmlns:a16="http://schemas.microsoft.com/office/drawing/2014/main" id="{DA5C5F83-64B7-4A75-8410-4392ACD4BFBA}"/>
+              </a:ext>
+            </a:extLst>
+          </p:cNvPr>
+          <p:cNvPicPr>
+            <a:picLocks noChangeAspect="1" noChangeArrowheads="1"/>
+          </p:cNvPicPr>
+          <p:nvPr/>
+        </p:nvPicPr>
+        <p:blipFill>
+          <a:blip r:embed="rId2">
+            <a:extLst>
+              <a:ext uri="{28A0092B-C50C-407E-A947-70E740481C1C}">
+                <a14:useLocalDpi xmlns:a14="http://schemas.microsoft.com/office/drawing/2010/main" val="0"/>
+              </a:ext>
+            </a:extLst>
+          </a:blip>
+          <a:srcRect/>
+          <a:stretch>
+            <a:fillRect/>
+          </a:stretch>
+        </p:blipFill>
+        <p:spPr bwMode="auto">
+          <a:xfrm>
+            <a:off x="311760" y="1661835"/>
+            <a:ext cx="2990850" cy="2905125"/>
+          </a:xfrm>
+          <a:prstGeom prst="rect">
+            <a:avLst/>
+          </a:prstGeom>
+          <a:noFill/>
+          <a:extLst>
+            <a:ext uri="{909E8E84-426E-40DD-AFC4-6F175D3DCCD1}">
+              <a14:hiddenFill xmlns:a14="http://schemas.microsoft.com/office/drawing/2010/main">
+                <a:solidFill>
+                  <a:srgbClr val="FFFFFF"/>
+                </a:solidFill>
+              </a14:hiddenFill>
+            </a:ext>
+          </a:extLst>
+        </p:spPr>
+      </p:pic>
     </p:spTree>
   </p:cSld>
   <p:clrMapOvr>

</xml_diff>

<commit_message>
finished part 3 code
</commit_message>
<xml_diff>
--- a/PS2/proj2_template.pptx
+++ b/PS2/proj2_template.pptx
@@ -10506,10 +10506,10 @@
       </p:sp>
       <p:pic>
         <p:nvPicPr>
-          <p:cNvPr id="1028" name="Picture 4">
+          <p:cNvPr id="2050" name="Picture 2">
             <a:extLst>
               <a:ext uri="{FF2B5EF4-FFF2-40B4-BE49-F238E27FC236}">
-                <a16:creationId xmlns:a16="http://schemas.microsoft.com/office/drawing/2014/main" id="{390C6FCF-EF89-4797-8E0C-71D6397F7C9C}"/>
+                <a16:creationId xmlns:a16="http://schemas.microsoft.com/office/drawing/2014/main" id="{F55DD20E-E00A-4A73-939E-C40FDA223D17}"/>
               </a:ext>
             </a:extLst>
           </p:cNvPr>
@@ -10533,8 +10533,8 @@
         </p:blipFill>
         <p:spPr bwMode="auto">
           <a:xfrm>
-            <a:off x="385330" y="1710604"/>
-            <a:ext cx="2990850" cy="2886075"/>
+            <a:off x="390093" y="1691554"/>
+            <a:ext cx="2981325" cy="2905125"/>
           </a:xfrm>
           <a:prstGeom prst="rect">
             <a:avLst/>
@@ -10553,10 +10553,10 @@
       </p:pic>
       <p:pic>
         <p:nvPicPr>
-          <p:cNvPr id="1030" name="Picture 6">
+          <p:cNvPr id="2052" name="Picture 4">
             <a:extLst>
               <a:ext uri="{FF2B5EF4-FFF2-40B4-BE49-F238E27FC236}">
-                <a16:creationId xmlns:a16="http://schemas.microsoft.com/office/drawing/2014/main" id="{BCE2BC16-BA4E-4C8F-90C8-4FFA95F7A4BB}"/>
+                <a16:creationId xmlns:a16="http://schemas.microsoft.com/office/drawing/2014/main" id="{51A1B193-B97E-40BD-AC77-745D557FB452}"/>
               </a:ext>
             </a:extLst>
           </p:cNvPr>
@@ -10580,8 +10580,8 @@
         </p:blipFill>
         <p:spPr bwMode="auto">
           <a:xfrm>
-            <a:off x="4749610" y="1710604"/>
-            <a:ext cx="2990850" cy="2886075"/>
+            <a:off x="4604038" y="1672504"/>
+            <a:ext cx="2990850" cy="2924175"/>
           </a:xfrm>
           <a:prstGeom prst="rect">
             <a:avLst/>
@@ -11380,16 +11380,36 @@
               </a:tabLst>
             </a:pPr>
             <a:r>
-              <a:rPr lang="en-US" sz="1400" b="0" strike="noStrike" spc="-1">
+              <a:rPr lang="en-US" sz="1400" b="0" strike="noStrike" spc="-1" dirty="0">
                 <a:solidFill>
                   <a:srgbClr val="595959"/>
                 </a:solidFill>
                 <a:latin typeface="Arial"/>
                 <a:ea typeface="Arial"/>
               </a:rPr>
-              <a:t>&lt;Insert right image with epipolar lines&gt; [1]</a:t>
+              <a:t>&lt;Insert right image with </a:t>
             </a:r>
-            <a:endParaRPr lang="en-US" sz="1400" b="0" strike="noStrike" spc="-1">
+            <a:r>
+              <a:rPr lang="en-US" sz="1400" b="0" strike="noStrike" spc="-1" dirty="0" err="1">
+                <a:solidFill>
+                  <a:srgbClr val="595959"/>
+                </a:solidFill>
+                <a:latin typeface="Arial"/>
+                <a:ea typeface="Arial"/>
+              </a:rPr>
+              <a:t>epipolar</a:t>
+            </a:r>
+            <a:r>
+              <a:rPr lang="en-US" sz="1400" b="0" strike="noStrike" spc="-1" dirty="0">
+                <a:solidFill>
+                  <a:srgbClr val="595959"/>
+                </a:solidFill>
+                <a:latin typeface="Arial"/>
+                <a:ea typeface="Arial"/>
+              </a:rPr>
+              <a:t> lines&gt; [1]</a:t>
+            </a:r>
+            <a:endParaRPr lang="en-US" sz="1400" b="0" strike="noStrike" spc="-1" dirty="0">
               <a:latin typeface="Arial"/>
             </a:endParaRPr>
           </a:p>
@@ -11402,12 +11422,59 @@
                 <a:tab pos="0" algn="l"/>
               </a:tabLst>
             </a:pPr>
-            <a:endParaRPr lang="en-US" sz="1400" b="0" strike="noStrike" spc="-1">
-              <a:latin typeface="Arial"/>
-            </a:endParaRPr>
-          </a:p>
-        </p:txBody>
-      </p:sp>
+            <a:endParaRPr lang="en-US" sz="1400" b="0" strike="noStrike" spc="-1" dirty="0">
+              <a:latin typeface="Arial"/>
+            </a:endParaRPr>
+          </a:p>
+        </p:txBody>
+      </p:sp>
+      <p:pic>
+        <p:nvPicPr>
+          <p:cNvPr id="1026" name="Picture 2">
+            <a:extLst>
+              <a:ext uri="{FF2B5EF4-FFF2-40B4-BE49-F238E27FC236}">
+                <a16:creationId xmlns:a16="http://schemas.microsoft.com/office/drawing/2014/main" id="{D84B6C91-4141-4C86-ABB1-2F8A9D985A06}"/>
+              </a:ext>
+            </a:extLst>
+          </p:cNvPr>
+          <p:cNvPicPr>
+            <a:picLocks noChangeAspect="1" noChangeArrowheads="1"/>
+          </p:cNvPicPr>
+          <p:nvPr/>
+        </p:nvPicPr>
+        <p:blipFill>
+          <a:blip r:embed="rId2">
+            <a:extLst>
+              <a:ext uri="{28A0092B-C50C-407E-A947-70E740481C1C}">
+                <a14:useLocalDpi xmlns:a14="http://schemas.microsoft.com/office/drawing/2010/main" val="0"/>
+              </a:ext>
+            </a:extLst>
+          </a:blip>
+          <a:srcRect/>
+          <a:stretch>
+            <a:fillRect/>
+          </a:stretch>
+        </p:blipFill>
+        <p:spPr bwMode="auto">
+          <a:xfrm>
+            <a:off x="310680" y="1769785"/>
+            <a:ext cx="8164838" cy="2599707"/>
+          </a:xfrm>
+          <a:prstGeom prst="rect">
+            <a:avLst/>
+          </a:prstGeom>
+          <a:noFill/>
+          <a:extLst>
+            <a:ext uri="{909E8E84-426E-40DD-AFC4-6F175D3DCCD1}">
+              <a14:hiddenFill xmlns:a14="http://schemas.microsoft.com/office/drawing/2010/main">
+                <a:solidFill>
+                  <a:srgbClr val="FFFFFF"/>
+                </a:solidFill>
+              </a14:hiddenFill>
+            </a:ext>
+          </a:extLst>
+        </p:spPr>
+      </p:pic>
     </p:spTree>
   </p:cSld>
   <p:clrMapOvr>
@@ -11674,6 +11741,53 @@
           </a:p>
         </p:txBody>
       </p:sp>
+      <p:pic>
+        <p:nvPicPr>
+          <p:cNvPr id="3074" name="Picture 2">
+            <a:extLst>
+              <a:ext uri="{FF2B5EF4-FFF2-40B4-BE49-F238E27FC236}">
+                <a16:creationId xmlns:a16="http://schemas.microsoft.com/office/drawing/2014/main" id="{F7AB43DA-426B-4A79-A59D-CDC8CC464810}"/>
+              </a:ext>
+            </a:extLst>
+          </p:cNvPr>
+          <p:cNvPicPr>
+            <a:picLocks noChangeAspect="1" noChangeArrowheads="1"/>
+          </p:cNvPicPr>
+          <p:nvPr/>
+        </p:nvPicPr>
+        <p:blipFill>
+          <a:blip r:embed="rId2">
+            <a:extLst>
+              <a:ext uri="{28A0092B-C50C-407E-A947-70E740481C1C}">
+                <a14:useLocalDpi xmlns:a14="http://schemas.microsoft.com/office/drawing/2010/main" val="0"/>
+              </a:ext>
+            </a:extLst>
+          </a:blip>
+          <a:srcRect/>
+          <a:stretch>
+            <a:fillRect/>
+          </a:stretch>
+        </p:blipFill>
+        <p:spPr bwMode="auto">
+          <a:xfrm>
+            <a:off x="341870" y="1687919"/>
+            <a:ext cx="7939702" cy="2821628"/>
+          </a:xfrm>
+          <a:prstGeom prst="rect">
+            <a:avLst/>
+          </a:prstGeom>
+          <a:noFill/>
+          <a:extLst>
+            <a:ext uri="{909E8E84-426E-40DD-AFC4-6F175D3DCCD1}">
+              <a14:hiddenFill xmlns:a14="http://schemas.microsoft.com/office/drawing/2010/main">
+                <a:solidFill>
+                  <a:srgbClr val="FFFFFF"/>
+                </a:solidFill>
+              </a14:hiddenFill>
+            </a:ext>
+          </a:extLst>
+        </p:spPr>
+      </p:pic>
     </p:spTree>
   </p:cSld>
   <p:clrMapOvr>

</xml_diff>